<commit_message>
#1 mock up sign in and register form
</commit_message>
<xml_diff>
--- a/docs/sign-in-sign-up.pptx
+++ b/docs/sign-in-sign-up.pptx
@@ -4,10 +4,13 @@
   <p:sldMasterIdLst>
     <p:sldMasterId id="2147483648" r:id="rId1"/>
   </p:sldMasterIdLst>
+  <p:notesMasterIdLst>
+    <p:notesMasterId r:id="rId5"/>
+  </p:notesMasterIdLst>
   <p:sldIdLst>
     <p:sldId id="256" r:id="rId2"/>
     <p:sldId id="257" r:id="rId3"/>
-    <p:sldId id="259" r:id="rId4"/>
+    <p:sldId id="258" r:id="rId4"/>
   </p:sldIdLst>
   <p:sldSz cx="12192000" cy="6858000"/>
   <p:notesSz cx="6858000" cy="9144000"/>
@@ -117,7 +120,7 @@
         <p14:section name="Register-form" id="{975FF99D-ED23-4723-8897-B9E3615B495A}">
           <p14:sldIdLst>
             <p14:sldId id="257"/>
-            <p14:sldId id="259"/>
+            <p14:sldId id="258"/>
           </p14:sldIdLst>
         </p14:section>
       </p14:sectionLst>
@@ -127,6 +130,571 @@
     </p:ext>
   </p:extLst>
 </p:presentation>
+</file>
+
+<file path=ppt/notesMasters/notesMaster1.xml><?xml version="1.0" encoding="utf-8"?>
+<p:notesMaster xmlns:a="http://schemas.openxmlformats.org/drawingml/2006/main" xmlns:r="http://schemas.openxmlformats.org/officeDocument/2006/relationships" xmlns:p="http://schemas.openxmlformats.org/presentationml/2006/main">
+  <p:cSld>
+    <p:bg>
+      <p:bgRef idx="1001">
+        <a:schemeClr val="bg1"/>
+      </p:bgRef>
+    </p:bg>
+    <p:spTree>
+      <p:nvGrpSpPr>
+        <p:cNvPr id="1" name=""/>
+        <p:cNvGrpSpPr/>
+        <p:nvPr/>
+      </p:nvGrpSpPr>
+      <p:grpSpPr>
+        <a:xfrm>
+          <a:off x="0" y="0"/>
+          <a:ext cx="0" cy="0"/>
+          <a:chOff x="0" y="0"/>
+          <a:chExt cx="0" cy="0"/>
+        </a:xfrm>
+      </p:grpSpPr>
+      <p:sp>
+        <p:nvSpPr>
+          <p:cNvPr id="2" name="Header Placeholder 1"/>
+          <p:cNvSpPr>
+            <a:spLocks noGrp="1"/>
+          </p:cNvSpPr>
+          <p:nvPr>
+            <p:ph type="hdr" sz="quarter"/>
+          </p:nvPr>
+        </p:nvSpPr>
+        <p:spPr>
+          <a:xfrm>
+            <a:off x="0" y="0"/>
+            <a:ext cx="2971800" cy="458788"/>
+          </a:xfrm>
+          <a:prstGeom prst="rect">
+            <a:avLst/>
+          </a:prstGeom>
+        </p:spPr>
+        <p:txBody>
+          <a:bodyPr vert="horz" lIns="91440" tIns="45720" rIns="91440" bIns="45720" rtlCol="0"/>
+          <a:lstStyle>
+            <a:lvl1pPr algn="l">
+              <a:defRPr sz="1200"/>
+            </a:lvl1pPr>
+          </a:lstStyle>
+          <a:p>
+            <a:endParaRPr lang="en-US"/>
+          </a:p>
+        </p:txBody>
+      </p:sp>
+      <p:sp>
+        <p:nvSpPr>
+          <p:cNvPr id="3" name="Date Placeholder 2"/>
+          <p:cNvSpPr>
+            <a:spLocks noGrp="1"/>
+          </p:cNvSpPr>
+          <p:nvPr>
+            <p:ph type="dt" idx="1"/>
+          </p:nvPr>
+        </p:nvSpPr>
+        <p:spPr>
+          <a:xfrm>
+            <a:off x="3884613" y="0"/>
+            <a:ext cx="2971800" cy="458788"/>
+          </a:xfrm>
+          <a:prstGeom prst="rect">
+            <a:avLst/>
+          </a:prstGeom>
+        </p:spPr>
+        <p:txBody>
+          <a:bodyPr vert="horz" lIns="91440" tIns="45720" rIns="91440" bIns="45720" rtlCol="0"/>
+          <a:lstStyle>
+            <a:lvl1pPr algn="r">
+              <a:defRPr sz="1200"/>
+            </a:lvl1pPr>
+          </a:lstStyle>
+          <a:p>
+            <a:fld id="{B431DDDE-ECC3-46BF-A8CA-A2D266C9544F}" type="datetimeFigureOut">
+              <a:rPr lang="en-US" smtClean="0"/>
+              <a:t>11/26/2021</a:t>
+            </a:fld>
+            <a:endParaRPr lang="en-US"/>
+          </a:p>
+        </p:txBody>
+      </p:sp>
+      <p:sp>
+        <p:nvSpPr>
+          <p:cNvPr id="4" name="Slide Image Placeholder 3"/>
+          <p:cNvSpPr>
+            <a:spLocks noGrp="1" noRot="1" noChangeAspect="1"/>
+          </p:cNvSpPr>
+          <p:nvPr>
+            <p:ph type="sldImg" idx="2"/>
+          </p:nvPr>
+        </p:nvSpPr>
+        <p:spPr>
+          <a:xfrm>
+            <a:off x="685800" y="1143000"/>
+            <a:ext cx="5486400" cy="3086100"/>
+          </a:xfrm>
+          <a:prstGeom prst="rect">
+            <a:avLst/>
+          </a:prstGeom>
+          <a:noFill/>
+          <a:ln w="12700">
+            <a:solidFill>
+              <a:prstClr val="black"/>
+            </a:solidFill>
+          </a:ln>
+        </p:spPr>
+        <p:txBody>
+          <a:bodyPr vert="horz" lIns="91440" tIns="45720" rIns="91440" bIns="45720" rtlCol="0" anchor="ctr"/>
+          <a:lstStyle/>
+          <a:p>
+            <a:endParaRPr lang="en-US"/>
+          </a:p>
+        </p:txBody>
+      </p:sp>
+      <p:sp>
+        <p:nvSpPr>
+          <p:cNvPr id="5" name="Notes Placeholder 4"/>
+          <p:cNvSpPr>
+            <a:spLocks noGrp="1"/>
+          </p:cNvSpPr>
+          <p:nvPr>
+            <p:ph type="body" sz="quarter" idx="3"/>
+          </p:nvPr>
+        </p:nvSpPr>
+        <p:spPr>
+          <a:xfrm>
+            <a:off x="685800" y="4400550"/>
+            <a:ext cx="5486400" cy="3600450"/>
+          </a:xfrm>
+          <a:prstGeom prst="rect">
+            <a:avLst/>
+          </a:prstGeom>
+        </p:spPr>
+        <p:txBody>
+          <a:bodyPr vert="horz" lIns="91440" tIns="45720" rIns="91440" bIns="45720" rtlCol="0"/>
+          <a:lstStyle/>
+          <a:p>
+            <a:pPr lvl="0"/>
+            <a:r>
+              <a:rPr lang="en-US"/>
+              <a:t>Edit Master text styles</a:t>
+            </a:r>
+          </a:p>
+          <a:p>
+            <a:pPr lvl="1"/>
+            <a:r>
+              <a:rPr lang="en-US"/>
+              <a:t>Second level</a:t>
+            </a:r>
+          </a:p>
+          <a:p>
+            <a:pPr lvl="2"/>
+            <a:r>
+              <a:rPr lang="en-US"/>
+              <a:t>Third level</a:t>
+            </a:r>
+          </a:p>
+          <a:p>
+            <a:pPr lvl="3"/>
+            <a:r>
+              <a:rPr lang="en-US"/>
+              <a:t>Fourth level</a:t>
+            </a:r>
+          </a:p>
+          <a:p>
+            <a:pPr lvl="4"/>
+            <a:r>
+              <a:rPr lang="en-US"/>
+              <a:t>Fifth level</a:t>
+            </a:r>
+          </a:p>
+        </p:txBody>
+      </p:sp>
+      <p:sp>
+        <p:nvSpPr>
+          <p:cNvPr id="6" name="Footer Placeholder 5"/>
+          <p:cNvSpPr>
+            <a:spLocks noGrp="1"/>
+          </p:cNvSpPr>
+          <p:nvPr>
+            <p:ph type="ftr" sz="quarter" idx="4"/>
+          </p:nvPr>
+        </p:nvSpPr>
+        <p:spPr>
+          <a:xfrm>
+            <a:off x="0" y="8685213"/>
+            <a:ext cx="2971800" cy="458787"/>
+          </a:xfrm>
+          <a:prstGeom prst="rect">
+            <a:avLst/>
+          </a:prstGeom>
+        </p:spPr>
+        <p:txBody>
+          <a:bodyPr vert="horz" lIns="91440" tIns="45720" rIns="91440" bIns="45720" rtlCol="0" anchor="b"/>
+          <a:lstStyle>
+            <a:lvl1pPr algn="l">
+              <a:defRPr sz="1200"/>
+            </a:lvl1pPr>
+          </a:lstStyle>
+          <a:p>
+            <a:endParaRPr lang="en-US"/>
+          </a:p>
+        </p:txBody>
+      </p:sp>
+      <p:sp>
+        <p:nvSpPr>
+          <p:cNvPr id="7" name="Slide Number Placeholder 6"/>
+          <p:cNvSpPr>
+            <a:spLocks noGrp="1"/>
+          </p:cNvSpPr>
+          <p:nvPr>
+            <p:ph type="sldNum" sz="quarter" idx="5"/>
+          </p:nvPr>
+        </p:nvSpPr>
+        <p:spPr>
+          <a:xfrm>
+            <a:off x="3884613" y="8685213"/>
+            <a:ext cx="2971800" cy="458787"/>
+          </a:xfrm>
+          <a:prstGeom prst="rect">
+            <a:avLst/>
+          </a:prstGeom>
+        </p:spPr>
+        <p:txBody>
+          <a:bodyPr vert="horz" lIns="91440" tIns="45720" rIns="91440" bIns="45720" rtlCol="0" anchor="b"/>
+          <a:lstStyle>
+            <a:lvl1pPr algn="r">
+              <a:defRPr sz="1200"/>
+            </a:lvl1pPr>
+          </a:lstStyle>
+          <a:p>
+            <a:fld id="{6CC8535B-415A-4149-82AB-A2D7BDE3C0E3}" type="slidenum">
+              <a:rPr lang="en-US" smtClean="0"/>
+              <a:t>‹#›</a:t>
+            </a:fld>
+            <a:endParaRPr lang="en-US"/>
+          </a:p>
+        </p:txBody>
+      </p:sp>
+    </p:spTree>
+    <p:extLst>
+      <p:ext uri="{BB962C8B-B14F-4D97-AF65-F5344CB8AC3E}">
+        <p14:creationId xmlns:p14="http://schemas.microsoft.com/office/powerpoint/2010/main" val="2460175070"/>
+      </p:ext>
+    </p:extLst>
+  </p:cSld>
+  <p:clrMap bg1="lt1" tx1="dk1" bg2="lt2" tx2="dk2" accent1="accent1" accent2="accent2" accent3="accent3" accent4="accent4" accent5="accent5" accent6="accent6" hlink="hlink" folHlink="folHlink"/>
+  <p:notesStyle>
+    <a:lvl1pPr marL="0" algn="l" defTabSz="914400" rtl="0" eaLnBrk="1" latinLnBrk="0" hangingPunct="1">
+      <a:defRPr sz="1200" kern="1200">
+        <a:solidFill>
+          <a:schemeClr val="tx1"/>
+        </a:solidFill>
+        <a:latin typeface="+mn-lt"/>
+        <a:ea typeface="+mn-ea"/>
+        <a:cs typeface="+mn-cs"/>
+      </a:defRPr>
+    </a:lvl1pPr>
+    <a:lvl2pPr marL="457200" algn="l" defTabSz="914400" rtl="0" eaLnBrk="1" latinLnBrk="0" hangingPunct="1">
+      <a:defRPr sz="1200" kern="1200">
+        <a:solidFill>
+          <a:schemeClr val="tx1"/>
+        </a:solidFill>
+        <a:latin typeface="+mn-lt"/>
+        <a:ea typeface="+mn-ea"/>
+        <a:cs typeface="+mn-cs"/>
+      </a:defRPr>
+    </a:lvl2pPr>
+    <a:lvl3pPr marL="914400" algn="l" defTabSz="914400" rtl="0" eaLnBrk="1" latinLnBrk="0" hangingPunct="1">
+      <a:defRPr sz="1200" kern="1200">
+        <a:solidFill>
+          <a:schemeClr val="tx1"/>
+        </a:solidFill>
+        <a:latin typeface="+mn-lt"/>
+        <a:ea typeface="+mn-ea"/>
+        <a:cs typeface="+mn-cs"/>
+      </a:defRPr>
+    </a:lvl3pPr>
+    <a:lvl4pPr marL="1371600" algn="l" defTabSz="914400" rtl="0" eaLnBrk="1" latinLnBrk="0" hangingPunct="1">
+      <a:defRPr sz="1200" kern="1200">
+        <a:solidFill>
+          <a:schemeClr val="tx1"/>
+        </a:solidFill>
+        <a:latin typeface="+mn-lt"/>
+        <a:ea typeface="+mn-ea"/>
+        <a:cs typeface="+mn-cs"/>
+      </a:defRPr>
+    </a:lvl4pPr>
+    <a:lvl5pPr marL="1828800" algn="l" defTabSz="914400" rtl="0" eaLnBrk="1" latinLnBrk="0" hangingPunct="1">
+      <a:defRPr sz="1200" kern="1200">
+        <a:solidFill>
+          <a:schemeClr val="tx1"/>
+        </a:solidFill>
+        <a:latin typeface="+mn-lt"/>
+        <a:ea typeface="+mn-ea"/>
+        <a:cs typeface="+mn-cs"/>
+      </a:defRPr>
+    </a:lvl5pPr>
+    <a:lvl6pPr marL="2286000" algn="l" defTabSz="914400" rtl="0" eaLnBrk="1" latinLnBrk="0" hangingPunct="1">
+      <a:defRPr sz="1200" kern="1200">
+        <a:solidFill>
+          <a:schemeClr val="tx1"/>
+        </a:solidFill>
+        <a:latin typeface="+mn-lt"/>
+        <a:ea typeface="+mn-ea"/>
+        <a:cs typeface="+mn-cs"/>
+      </a:defRPr>
+    </a:lvl6pPr>
+    <a:lvl7pPr marL="2743200" algn="l" defTabSz="914400" rtl="0" eaLnBrk="1" latinLnBrk="0" hangingPunct="1">
+      <a:defRPr sz="1200" kern="1200">
+        <a:solidFill>
+          <a:schemeClr val="tx1"/>
+        </a:solidFill>
+        <a:latin typeface="+mn-lt"/>
+        <a:ea typeface="+mn-ea"/>
+        <a:cs typeface="+mn-cs"/>
+      </a:defRPr>
+    </a:lvl7pPr>
+    <a:lvl8pPr marL="3200400" algn="l" defTabSz="914400" rtl="0" eaLnBrk="1" latinLnBrk="0" hangingPunct="1">
+      <a:defRPr sz="1200" kern="1200">
+        <a:solidFill>
+          <a:schemeClr val="tx1"/>
+        </a:solidFill>
+        <a:latin typeface="+mn-lt"/>
+        <a:ea typeface="+mn-ea"/>
+        <a:cs typeface="+mn-cs"/>
+      </a:defRPr>
+    </a:lvl8pPr>
+    <a:lvl9pPr marL="3657600" algn="l" defTabSz="914400" rtl="0" eaLnBrk="1" latinLnBrk="0" hangingPunct="1">
+      <a:defRPr sz="1200" kern="1200">
+        <a:solidFill>
+          <a:schemeClr val="tx1"/>
+        </a:solidFill>
+        <a:latin typeface="+mn-lt"/>
+        <a:ea typeface="+mn-ea"/>
+        <a:cs typeface="+mn-cs"/>
+      </a:defRPr>
+    </a:lvl9pPr>
+  </p:notesStyle>
+</p:notesMaster>
+</file>
+
+<file path=ppt/notesSlides/notesSlide1.xml><?xml version="1.0" encoding="utf-8"?>
+<p:notes xmlns:a="http://schemas.openxmlformats.org/drawingml/2006/main" xmlns:r="http://schemas.openxmlformats.org/officeDocument/2006/relationships" xmlns:p="http://schemas.openxmlformats.org/presentationml/2006/main">
+  <p:cSld>
+    <p:spTree>
+      <p:nvGrpSpPr>
+        <p:cNvPr id="1" name=""/>
+        <p:cNvGrpSpPr/>
+        <p:nvPr/>
+      </p:nvGrpSpPr>
+      <p:grpSpPr>
+        <a:xfrm>
+          <a:off x="0" y="0"/>
+          <a:ext cx="0" cy="0"/>
+          <a:chOff x="0" y="0"/>
+          <a:chExt cx="0" cy="0"/>
+        </a:xfrm>
+      </p:grpSpPr>
+      <p:sp>
+        <p:nvSpPr>
+          <p:cNvPr id="2" name="Slide Image Placeholder 1"/>
+          <p:cNvSpPr>
+            <a:spLocks noGrp="1" noRot="1" noChangeAspect="1"/>
+          </p:cNvSpPr>
+          <p:nvPr>
+            <p:ph type="sldImg"/>
+          </p:nvPr>
+        </p:nvSpPr>
+        <p:spPr/>
+      </p:sp>
+      <p:sp>
+        <p:nvSpPr>
+          <p:cNvPr id="3" name="Notes Placeholder 2"/>
+          <p:cNvSpPr>
+            <a:spLocks noGrp="1"/>
+          </p:cNvSpPr>
+          <p:nvPr>
+            <p:ph type="body" idx="1"/>
+          </p:nvPr>
+        </p:nvSpPr>
+        <p:spPr/>
+        <p:txBody>
+          <a:bodyPr/>
+          <a:lstStyle/>
+          <a:p>
+            <a:r>
+              <a:rPr lang="en-US" dirty="0" err="1"/>
+              <a:t>Bg</a:t>
+            </a:r>
+            <a:r>
+              <a:rPr lang="en-US" dirty="0"/>
+              <a:t> form: #004F6C</a:t>
+            </a:r>
+          </a:p>
+          <a:p>
+            <a:r>
+              <a:rPr lang="en-US" dirty="0" err="1"/>
+              <a:t>Bg</a:t>
+            </a:r>
+            <a:r>
+              <a:rPr lang="en-US" dirty="0"/>
+              <a:t> input and </a:t>
+            </a:r>
+            <a:r>
+              <a:rPr lang="en-US" dirty="0" err="1"/>
+              <a:t>btn</a:t>
+            </a:r>
+            <a:r>
+              <a:rPr lang="en-US" dirty="0"/>
+              <a:t>: #006D95</a:t>
+            </a:r>
+          </a:p>
+          <a:p>
+            <a:r>
+              <a:rPr lang="en-US" dirty="0"/>
+              <a:t>Icon Event Me Create now! color: #0098CF</a:t>
+            </a:r>
+          </a:p>
+        </p:txBody>
+      </p:sp>
+      <p:sp>
+        <p:nvSpPr>
+          <p:cNvPr id="4" name="Slide Number Placeholder 3"/>
+          <p:cNvSpPr>
+            <a:spLocks noGrp="1"/>
+          </p:cNvSpPr>
+          <p:nvPr>
+            <p:ph type="sldNum" sz="quarter" idx="5"/>
+          </p:nvPr>
+        </p:nvSpPr>
+        <p:spPr/>
+        <p:txBody>
+          <a:bodyPr/>
+          <a:lstStyle/>
+          <a:p>
+            <a:fld id="{6CC8535B-415A-4149-82AB-A2D7BDE3C0E3}" type="slidenum">
+              <a:rPr lang="en-US" smtClean="0"/>
+              <a:t>1</a:t>
+            </a:fld>
+            <a:endParaRPr lang="en-US"/>
+          </a:p>
+        </p:txBody>
+      </p:sp>
+    </p:spTree>
+    <p:extLst>
+      <p:ext uri="{BB962C8B-B14F-4D97-AF65-F5344CB8AC3E}">
+        <p14:creationId xmlns:p14="http://schemas.microsoft.com/office/powerpoint/2010/main" val="3199417542"/>
+      </p:ext>
+    </p:extLst>
+  </p:cSld>
+  <p:clrMapOvr>
+    <a:masterClrMapping/>
+  </p:clrMapOvr>
+</p:notes>
+</file>
+
+<file path=ppt/notesSlides/notesSlide2.xml><?xml version="1.0" encoding="utf-8"?>
+<p:notes xmlns:a="http://schemas.openxmlformats.org/drawingml/2006/main" xmlns:r="http://schemas.openxmlformats.org/officeDocument/2006/relationships" xmlns:p="http://schemas.openxmlformats.org/presentationml/2006/main">
+  <p:cSld>
+    <p:spTree>
+      <p:nvGrpSpPr>
+        <p:cNvPr id="1" name=""/>
+        <p:cNvGrpSpPr/>
+        <p:nvPr/>
+      </p:nvGrpSpPr>
+      <p:grpSpPr>
+        <a:xfrm>
+          <a:off x="0" y="0"/>
+          <a:ext cx="0" cy="0"/>
+          <a:chOff x="0" y="0"/>
+          <a:chExt cx="0" cy="0"/>
+        </a:xfrm>
+      </p:grpSpPr>
+      <p:sp>
+        <p:nvSpPr>
+          <p:cNvPr id="2" name="Slide Image Placeholder 1"/>
+          <p:cNvSpPr>
+            <a:spLocks noGrp="1" noRot="1" noChangeAspect="1"/>
+          </p:cNvSpPr>
+          <p:nvPr>
+            <p:ph type="sldImg"/>
+          </p:nvPr>
+        </p:nvSpPr>
+        <p:spPr/>
+      </p:sp>
+      <p:sp>
+        <p:nvSpPr>
+          <p:cNvPr id="3" name="Notes Placeholder 2"/>
+          <p:cNvSpPr>
+            <a:spLocks noGrp="1"/>
+          </p:cNvSpPr>
+          <p:nvPr>
+            <p:ph type="body" idx="1"/>
+          </p:nvPr>
+        </p:nvSpPr>
+        <p:spPr/>
+        <p:txBody>
+          <a:bodyPr/>
+          <a:lstStyle/>
+          <a:p>
+            <a:r>
+              <a:rPr lang="en-US" dirty="0" err="1"/>
+              <a:t>Bg</a:t>
+            </a:r>
+            <a:r>
+              <a:rPr lang="en-US" dirty="0"/>
+              <a:t> left: #004F6C</a:t>
+            </a:r>
+          </a:p>
+          <a:p>
+            <a:r>
+              <a:rPr lang="en-US" dirty="0" err="1"/>
+              <a:t>Bg</a:t>
+            </a:r>
+            <a:r>
+              <a:rPr lang="en-US" dirty="0"/>
+              <a:t> right: #005C7D</a:t>
+            </a:r>
+          </a:p>
+        </p:txBody>
+      </p:sp>
+      <p:sp>
+        <p:nvSpPr>
+          <p:cNvPr id="4" name="Slide Number Placeholder 3"/>
+          <p:cNvSpPr>
+            <a:spLocks noGrp="1"/>
+          </p:cNvSpPr>
+          <p:nvPr>
+            <p:ph type="sldNum" sz="quarter" idx="5"/>
+          </p:nvPr>
+        </p:nvSpPr>
+        <p:spPr/>
+        <p:txBody>
+          <a:bodyPr/>
+          <a:lstStyle/>
+          <a:p>
+            <a:fld id="{6CC8535B-415A-4149-82AB-A2D7BDE3C0E3}" type="slidenum">
+              <a:rPr lang="en-US" smtClean="0"/>
+              <a:t>2</a:t>
+            </a:fld>
+            <a:endParaRPr lang="en-US"/>
+          </a:p>
+        </p:txBody>
+      </p:sp>
+    </p:spTree>
+    <p:extLst>
+      <p:ext uri="{BB962C8B-B14F-4D97-AF65-F5344CB8AC3E}">
+        <p14:creationId xmlns:p14="http://schemas.microsoft.com/office/powerpoint/2010/main" val="2188826898"/>
+      </p:ext>
+    </p:extLst>
+  </p:cSld>
+  <p:clrMapOvr>
+    <a:masterClrMapping/>
+  </p:clrMapOvr>
+</p:notes>
 </file>
 
 <file path=ppt/slideLayouts/slideLayout1.xml><?xml version="1.0" encoding="utf-8"?>
@@ -276,7 +844,7 @@
           <a:p>
             <a:fld id="{3A4F52EC-B4D5-44DC-A76E-9B8A6C1E9252}" type="datetimeFigureOut">
               <a:rPr lang="en-US" smtClean="0"/>
-              <a:t>11/25/2021</a:t>
+              <a:t>11/26/2021</a:t>
             </a:fld>
             <a:endParaRPr lang="en-US"/>
           </a:p>
@@ -474,7 +1042,7 @@
           <a:p>
             <a:fld id="{3A4F52EC-B4D5-44DC-A76E-9B8A6C1E9252}" type="datetimeFigureOut">
               <a:rPr lang="en-US" smtClean="0"/>
-              <a:t>11/25/2021</a:t>
+              <a:t>11/26/2021</a:t>
             </a:fld>
             <a:endParaRPr lang="en-US"/>
           </a:p>
@@ -682,7 +1250,7 @@
           <a:p>
             <a:fld id="{3A4F52EC-B4D5-44DC-A76E-9B8A6C1E9252}" type="datetimeFigureOut">
               <a:rPr lang="en-US" smtClean="0"/>
-              <a:t>11/25/2021</a:t>
+              <a:t>11/26/2021</a:t>
             </a:fld>
             <a:endParaRPr lang="en-US"/>
           </a:p>
@@ -880,7 +1448,7 @@
           <a:p>
             <a:fld id="{3A4F52EC-B4D5-44DC-A76E-9B8A6C1E9252}" type="datetimeFigureOut">
               <a:rPr lang="en-US" smtClean="0"/>
-              <a:t>11/25/2021</a:t>
+              <a:t>11/26/2021</a:t>
             </a:fld>
             <a:endParaRPr lang="en-US"/>
           </a:p>
@@ -1155,7 +1723,7 @@
           <a:p>
             <a:fld id="{3A4F52EC-B4D5-44DC-A76E-9B8A6C1E9252}" type="datetimeFigureOut">
               <a:rPr lang="en-US" smtClean="0"/>
-              <a:t>11/25/2021</a:t>
+              <a:t>11/26/2021</a:t>
             </a:fld>
             <a:endParaRPr lang="en-US"/>
           </a:p>
@@ -1420,7 +1988,7 @@
           <a:p>
             <a:fld id="{3A4F52EC-B4D5-44DC-A76E-9B8A6C1E9252}" type="datetimeFigureOut">
               <a:rPr lang="en-US" smtClean="0"/>
-              <a:t>11/25/2021</a:t>
+              <a:t>11/26/2021</a:t>
             </a:fld>
             <a:endParaRPr lang="en-US"/>
           </a:p>
@@ -1832,7 +2400,7 @@
           <a:p>
             <a:fld id="{3A4F52EC-B4D5-44DC-A76E-9B8A6C1E9252}" type="datetimeFigureOut">
               <a:rPr lang="en-US" smtClean="0"/>
-              <a:t>11/25/2021</a:t>
+              <a:t>11/26/2021</a:t>
             </a:fld>
             <a:endParaRPr lang="en-US"/>
           </a:p>
@@ -1973,7 +2541,7 @@
           <a:p>
             <a:fld id="{3A4F52EC-B4D5-44DC-A76E-9B8A6C1E9252}" type="datetimeFigureOut">
               <a:rPr lang="en-US" smtClean="0"/>
-              <a:t>11/25/2021</a:t>
+              <a:t>11/26/2021</a:t>
             </a:fld>
             <a:endParaRPr lang="en-US"/>
           </a:p>
@@ -2086,7 +2654,7 @@
           <a:p>
             <a:fld id="{3A4F52EC-B4D5-44DC-A76E-9B8A6C1E9252}" type="datetimeFigureOut">
               <a:rPr lang="en-US" smtClean="0"/>
-              <a:t>11/25/2021</a:t>
+              <a:t>11/26/2021</a:t>
             </a:fld>
             <a:endParaRPr lang="en-US"/>
           </a:p>
@@ -2397,7 +2965,7 @@
           <a:p>
             <a:fld id="{3A4F52EC-B4D5-44DC-A76E-9B8A6C1E9252}" type="datetimeFigureOut">
               <a:rPr lang="en-US" smtClean="0"/>
-              <a:t>11/25/2021</a:t>
+              <a:t>11/26/2021</a:t>
             </a:fld>
             <a:endParaRPr lang="en-US"/>
           </a:p>
@@ -2685,7 +3253,7 @@
           <a:p>
             <a:fld id="{3A4F52EC-B4D5-44DC-A76E-9B8A6C1E9252}" type="datetimeFigureOut">
               <a:rPr lang="en-US" smtClean="0"/>
-              <a:t>11/25/2021</a:t>
+              <a:t>11/26/2021</a:t>
             </a:fld>
             <a:endParaRPr lang="en-US"/>
           </a:p>
@@ -2926,7 +3494,7 @@
           <a:p>
             <a:fld id="{3A4F52EC-B4D5-44DC-A76E-9B8A6C1E9252}" type="datetimeFigureOut">
               <a:rPr lang="en-US" smtClean="0"/>
-              <a:t>11/25/2021</a:t>
+              <a:t>11/26/2021</a:t>
             </a:fld>
             <a:endParaRPr lang="en-US"/>
           </a:p>
@@ -3343,305 +3911,36 @@
           <a:chExt cx="0" cy="0"/>
         </a:xfrm>
       </p:grpSpPr>
-      <p:sp>
-        <p:nvSpPr>
-          <p:cNvPr id="7" name="Oval 6">
-            <a:extLst>
-              <a:ext uri="{FF2B5EF4-FFF2-40B4-BE49-F238E27FC236}">
-                <a16:creationId xmlns:a16="http://schemas.microsoft.com/office/drawing/2014/main" id="{D981531D-218D-4885-8564-6E97E74DE1C9}"/>
-              </a:ext>
-            </a:extLst>
-          </p:cNvPr>
-          <p:cNvSpPr/>
+      <p:pic>
+        <p:nvPicPr>
+          <p:cNvPr id="2" name="Picture 1">
+            <a:extLst>
+              <a:ext uri="{FF2B5EF4-FFF2-40B4-BE49-F238E27FC236}">
+                <a16:creationId xmlns:a16="http://schemas.microsoft.com/office/drawing/2014/main" id="{D51E2C01-A791-43D5-877A-B8B5F7E426CF}"/>
+              </a:ext>
+            </a:extLst>
+          </p:cNvPr>
+          <p:cNvPicPr>
+            <a:picLocks noChangeAspect="1"/>
+          </p:cNvPicPr>
           <p:nvPr/>
-        </p:nvSpPr>
+        </p:nvPicPr>
+        <p:blipFill>
+          <a:blip r:embed="rId3"/>
+          <a:stretch>
+            <a:fillRect/>
+          </a:stretch>
+        </p:blipFill>
         <p:spPr>
           <a:xfrm>
-            <a:off x="4917286" y="134304"/>
-            <a:ext cx="2100262" cy="2100262"/>
-          </a:xfrm>
-          <a:prstGeom prst="ellipse">
-            <a:avLst/>
-          </a:prstGeom>
-          <a:solidFill>
-            <a:srgbClr val="00B0F0"/>
-          </a:solidFill>
-        </p:spPr>
-        <p:style>
-          <a:lnRef idx="2">
-            <a:schemeClr val="accent1">
-              <a:shade val="50000"/>
-            </a:schemeClr>
-          </a:lnRef>
-          <a:fillRef idx="1">
-            <a:schemeClr val="accent1"/>
-          </a:fillRef>
-          <a:effectRef idx="0">
-            <a:schemeClr val="accent1"/>
-          </a:effectRef>
-          <a:fontRef idx="minor">
-            <a:schemeClr val="lt1"/>
-          </a:fontRef>
-        </p:style>
-        <p:txBody>
-          <a:bodyPr rtlCol="0" anchor="ctr"/>
-          <a:lstStyle/>
-          <a:p>
-            <a:pPr algn="ctr"/>
-            <a:endParaRPr lang="en-US"/>
-          </a:p>
-        </p:txBody>
-      </p:sp>
-      <p:sp>
-        <p:nvSpPr>
-          <p:cNvPr id="8" name="TextBox 7">
-            <a:extLst>
-              <a:ext uri="{FF2B5EF4-FFF2-40B4-BE49-F238E27FC236}">
-                <a16:creationId xmlns:a16="http://schemas.microsoft.com/office/drawing/2014/main" id="{37938559-6891-4DC6-B0B4-2212BB1CCFF2}"/>
-              </a:ext>
-            </a:extLst>
-          </p:cNvPr>
-          <p:cNvSpPr txBox="1"/>
-          <p:nvPr/>
-        </p:nvSpPr>
-        <p:spPr>
-          <a:xfrm>
-            <a:off x="5457828" y="2331546"/>
-            <a:ext cx="1042980" cy="369332"/>
+            <a:off x="2723967" y="139886"/>
+            <a:ext cx="6744066" cy="6578228"/>
           </a:xfrm>
           <a:prstGeom prst="rect">
             <a:avLst/>
           </a:prstGeom>
-          <a:noFill/>
         </p:spPr>
-        <p:txBody>
-          <a:bodyPr wrap="square" rtlCol="0">
-            <a:spAutoFit/>
-          </a:bodyPr>
-          <a:lstStyle/>
-          <a:p>
-            <a:r>
-              <a:rPr lang="en-US" dirty="0"/>
-              <a:t>PNC-VC2</a:t>
-            </a:r>
-          </a:p>
-        </p:txBody>
-      </p:sp>
-      <p:sp>
-        <p:nvSpPr>
-          <p:cNvPr id="9" name="TextBox 8">
-            <a:extLst>
-              <a:ext uri="{FF2B5EF4-FFF2-40B4-BE49-F238E27FC236}">
-                <a16:creationId xmlns:a16="http://schemas.microsoft.com/office/drawing/2014/main" id="{146E9E17-DAA2-44CB-963F-661D0AC72D2C}"/>
-              </a:ext>
-            </a:extLst>
-          </p:cNvPr>
-          <p:cNvSpPr txBox="1"/>
-          <p:nvPr/>
-        </p:nvSpPr>
-        <p:spPr>
-          <a:xfrm>
-            <a:off x="5057776" y="2671945"/>
-            <a:ext cx="2100263" cy="646331"/>
-          </a:xfrm>
-          <a:prstGeom prst="rect">
-            <a:avLst/>
-          </a:prstGeom>
-          <a:noFill/>
-        </p:spPr>
-        <p:txBody>
-          <a:bodyPr wrap="square" rtlCol="0">
-            <a:spAutoFit/>
-          </a:bodyPr>
-          <a:lstStyle/>
-          <a:p>
-            <a:r>
-              <a:rPr lang="en-US" sz="3600" dirty="0">
-                <a:solidFill>
-                  <a:srgbClr val="00B0F0"/>
-                </a:solidFill>
-              </a:rPr>
-              <a:t>Event Me</a:t>
-            </a:r>
-          </a:p>
-        </p:txBody>
-      </p:sp>
-      <p:sp>
-        <p:nvSpPr>
-          <p:cNvPr id="16" name="TextBox 15">
-            <a:extLst>
-              <a:ext uri="{FF2B5EF4-FFF2-40B4-BE49-F238E27FC236}">
-                <a16:creationId xmlns:a16="http://schemas.microsoft.com/office/drawing/2014/main" id="{9B384CA0-6715-4623-93ED-2D578324E324}"/>
-              </a:ext>
-            </a:extLst>
-          </p:cNvPr>
-          <p:cNvSpPr txBox="1"/>
-          <p:nvPr/>
-        </p:nvSpPr>
-        <p:spPr>
-          <a:xfrm>
-            <a:off x="3762373" y="3592950"/>
-            <a:ext cx="4433890" cy="369332"/>
-          </a:xfrm>
-          <a:prstGeom prst="rect">
-            <a:avLst/>
-          </a:prstGeom>
-          <a:noFill/>
-          <a:ln w="12700">
-            <a:solidFill>
-              <a:schemeClr val="tx1"/>
-            </a:solidFill>
-          </a:ln>
-        </p:spPr>
-        <p:txBody>
-          <a:bodyPr wrap="square" rtlCol="0">
-            <a:spAutoFit/>
-          </a:bodyPr>
-          <a:lstStyle/>
-          <a:p>
-            <a:r>
-              <a:rPr lang="en-US" dirty="0"/>
-              <a:t>Email….</a:t>
-            </a:r>
-          </a:p>
-        </p:txBody>
-      </p:sp>
-      <p:sp>
-        <p:nvSpPr>
-          <p:cNvPr id="17" name="TextBox 16">
-            <a:extLst>
-              <a:ext uri="{FF2B5EF4-FFF2-40B4-BE49-F238E27FC236}">
-                <a16:creationId xmlns:a16="http://schemas.microsoft.com/office/drawing/2014/main" id="{ED17AC42-3D00-4017-B9DE-EB3793112964}"/>
-              </a:ext>
-            </a:extLst>
-          </p:cNvPr>
-          <p:cNvSpPr txBox="1"/>
-          <p:nvPr/>
-        </p:nvSpPr>
-        <p:spPr>
-          <a:xfrm>
-            <a:off x="3762373" y="4458415"/>
-            <a:ext cx="4433890" cy="369332"/>
-          </a:xfrm>
-          <a:prstGeom prst="rect">
-            <a:avLst/>
-          </a:prstGeom>
-          <a:noFill/>
-          <a:ln w="12700">
-            <a:solidFill>
-              <a:schemeClr val="tx1"/>
-            </a:solidFill>
-          </a:ln>
-        </p:spPr>
-        <p:txBody>
-          <a:bodyPr wrap="square" rtlCol="0">
-            <a:spAutoFit/>
-          </a:bodyPr>
-          <a:lstStyle/>
-          <a:p>
-            <a:r>
-              <a:rPr lang="en-US" dirty="0"/>
-              <a:t>Password….</a:t>
-            </a:r>
-          </a:p>
-        </p:txBody>
-      </p:sp>
-      <p:sp>
-        <p:nvSpPr>
-          <p:cNvPr id="20" name="TextBox 19">
-            <a:extLst>
-              <a:ext uri="{FF2B5EF4-FFF2-40B4-BE49-F238E27FC236}">
-                <a16:creationId xmlns:a16="http://schemas.microsoft.com/office/drawing/2014/main" id="{794B622C-C6CB-460B-8F79-03B725D2AF67}"/>
-              </a:ext>
-            </a:extLst>
-          </p:cNvPr>
-          <p:cNvSpPr txBox="1"/>
-          <p:nvPr/>
-        </p:nvSpPr>
-        <p:spPr>
-          <a:xfrm>
-            <a:off x="3693320" y="5214225"/>
-            <a:ext cx="3807613" cy="369332"/>
-          </a:xfrm>
-          <a:prstGeom prst="rect">
-            <a:avLst/>
-          </a:prstGeom>
-          <a:noFill/>
-        </p:spPr>
-        <p:txBody>
-          <a:bodyPr wrap="square" rtlCol="0">
-            <a:spAutoFit/>
-          </a:bodyPr>
-          <a:lstStyle/>
-          <a:p>
-            <a:r>
-              <a:rPr lang="en-US" dirty="0"/>
-              <a:t>Already have an account</a:t>
-            </a:r>
-            <a:r>
-              <a:rPr lang="en-US" dirty="0">
-                <a:solidFill>
-                  <a:schemeClr val="accent1"/>
-                </a:solidFill>
-              </a:rPr>
-              <a:t>? </a:t>
-            </a:r>
-            <a:r>
-              <a:rPr lang="en-US" dirty="0">
-                <a:solidFill>
-                  <a:srgbClr val="00B0F0"/>
-                </a:solidFill>
-              </a:rPr>
-              <a:t>Create now</a:t>
-            </a:r>
-          </a:p>
-        </p:txBody>
-      </p:sp>
-      <p:sp>
-        <p:nvSpPr>
-          <p:cNvPr id="22" name="TextBox 21">
-            <a:extLst>
-              <a:ext uri="{FF2B5EF4-FFF2-40B4-BE49-F238E27FC236}">
-                <a16:creationId xmlns:a16="http://schemas.microsoft.com/office/drawing/2014/main" id="{5FF7AE07-2BA0-4760-A006-99280F906531}"/>
-              </a:ext>
-            </a:extLst>
-          </p:cNvPr>
-          <p:cNvSpPr txBox="1"/>
-          <p:nvPr/>
-        </p:nvSpPr>
-        <p:spPr>
-          <a:xfrm>
-            <a:off x="6900860" y="5895024"/>
-            <a:ext cx="1295403" cy="369332"/>
-          </a:xfrm>
-          <a:prstGeom prst="rect">
-            <a:avLst/>
-          </a:prstGeom>
-          <a:solidFill>
-            <a:srgbClr val="00B0F0"/>
-          </a:solidFill>
-          <a:ln w="12700">
-            <a:noFill/>
-          </a:ln>
-        </p:spPr>
-        <p:txBody>
-          <a:bodyPr wrap="square" rtlCol="0">
-            <a:spAutoFit/>
-          </a:bodyPr>
-          <a:lstStyle/>
-          <a:p>
-            <a:pPr algn="ctr"/>
-            <a:r>
-              <a:rPr lang="en-US" dirty="0">
-                <a:solidFill>
-                  <a:schemeClr val="bg1"/>
-                </a:solidFill>
-              </a:rPr>
-              <a:t>Login</a:t>
-            </a:r>
-          </a:p>
-        </p:txBody>
-      </p:sp>
+      </p:pic>
     </p:spTree>
     <p:extLst>
       <p:ext uri="{BB962C8B-B14F-4D97-AF65-F5344CB8AC3E}">
@@ -3672,463 +3971,40 @@
           <a:chExt cx="0" cy="0"/>
         </a:xfrm>
       </p:grpSpPr>
-      <p:sp>
-        <p:nvSpPr>
-          <p:cNvPr id="7" name="Oval 6">
-            <a:extLst>
-              <a:ext uri="{FF2B5EF4-FFF2-40B4-BE49-F238E27FC236}">
-                <a16:creationId xmlns:a16="http://schemas.microsoft.com/office/drawing/2014/main" id="{D981531D-218D-4885-8564-6E97E74DE1C9}"/>
-              </a:ext>
-            </a:extLst>
-          </p:cNvPr>
-          <p:cNvSpPr/>
+      <p:pic>
+        <p:nvPicPr>
+          <p:cNvPr id="2" name="Picture 1">
+            <a:extLst>
+              <a:ext uri="{FF2B5EF4-FFF2-40B4-BE49-F238E27FC236}">
+                <a16:creationId xmlns:a16="http://schemas.microsoft.com/office/drawing/2014/main" id="{C76DAC79-6E74-460C-A0D5-4FB69027A43E}"/>
+              </a:ext>
+            </a:extLst>
+          </p:cNvPr>
+          <p:cNvPicPr>
+            <a:picLocks noChangeAspect="1"/>
+          </p:cNvPicPr>
           <p:nvPr/>
-        </p:nvSpPr>
+        </p:nvPicPr>
+        <p:blipFill>
+          <a:blip r:embed="rId3"/>
+          <a:stretch>
+            <a:fillRect/>
+          </a:stretch>
+        </p:blipFill>
         <p:spPr>
           <a:xfrm>
-            <a:off x="2013337" y="1748431"/>
-            <a:ext cx="2100262" cy="2100262"/>
-          </a:xfrm>
-          <a:prstGeom prst="ellipse">
-            <a:avLst/>
-          </a:prstGeom>
-          <a:solidFill>
-            <a:srgbClr val="00B0F0"/>
-          </a:solidFill>
-        </p:spPr>
-        <p:style>
-          <a:lnRef idx="2">
-            <a:schemeClr val="accent1">
-              <a:shade val="50000"/>
-            </a:schemeClr>
-          </a:lnRef>
-          <a:fillRef idx="1">
-            <a:schemeClr val="accent1"/>
-          </a:fillRef>
-          <a:effectRef idx="0">
-            <a:schemeClr val="accent1"/>
-          </a:effectRef>
-          <a:fontRef idx="minor">
-            <a:schemeClr val="lt1"/>
-          </a:fontRef>
-        </p:style>
-        <p:txBody>
-          <a:bodyPr rtlCol="0" anchor="ctr"/>
-          <a:lstStyle/>
-          <a:p>
-            <a:pPr algn="ctr"/>
-            <a:endParaRPr lang="en-US"/>
-          </a:p>
-        </p:txBody>
-      </p:sp>
-      <p:sp>
-        <p:nvSpPr>
-          <p:cNvPr id="8" name="TextBox 7">
-            <a:extLst>
-              <a:ext uri="{FF2B5EF4-FFF2-40B4-BE49-F238E27FC236}">
-                <a16:creationId xmlns:a16="http://schemas.microsoft.com/office/drawing/2014/main" id="{37938559-6891-4DC6-B0B4-2212BB1CCFF2}"/>
-              </a:ext>
-            </a:extLst>
-          </p:cNvPr>
-          <p:cNvSpPr txBox="1"/>
-          <p:nvPr/>
-        </p:nvSpPr>
-        <p:spPr>
-          <a:xfrm>
-            <a:off x="2499116" y="4022826"/>
-            <a:ext cx="1042980" cy="369332"/>
+            <a:off x="1724969" y="460024"/>
+            <a:ext cx="8742062" cy="6397976"/>
           </a:xfrm>
           <a:prstGeom prst="rect">
             <a:avLst/>
           </a:prstGeom>
-          <a:noFill/>
         </p:spPr>
-        <p:txBody>
-          <a:bodyPr wrap="square" rtlCol="0">
-            <a:spAutoFit/>
-          </a:bodyPr>
-          <a:lstStyle/>
-          <a:p>
-            <a:r>
-              <a:rPr lang="en-US" dirty="0"/>
-              <a:t>PNC-VC2</a:t>
-            </a:r>
-          </a:p>
-        </p:txBody>
-      </p:sp>
-      <p:sp>
-        <p:nvSpPr>
-          <p:cNvPr id="9" name="TextBox 8">
-            <a:extLst>
-              <a:ext uri="{FF2B5EF4-FFF2-40B4-BE49-F238E27FC236}">
-                <a16:creationId xmlns:a16="http://schemas.microsoft.com/office/drawing/2014/main" id="{146E9E17-DAA2-44CB-963F-661D0AC72D2C}"/>
-              </a:ext>
-            </a:extLst>
-          </p:cNvPr>
-          <p:cNvSpPr txBox="1"/>
-          <p:nvPr/>
-        </p:nvSpPr>
-        <p:spPr>
-          <a:xfrm>
-            <a:off x="2013344" y="4383594"/>
-            <a:ext cx="2100255" cy="646331"/>
-          </a:xfrm>
-          <a:prstGeom prst="rect">
-            <a:avLst/>
-          </a:prstGeom>
-          <a:noFill/>
-        </p:spPr>
-        <p:txBody>
-          <a:bodyPr wrap="square" rtlCol="0">
-            <a:spAutoFit/>
-          </a:bodyPr>
-          <a:lstStyle/>
-          <a:p>
-            <a:r>
-              <a:rPr lang="en-US" sz="3600" dirty="0">
-                <a:solidFill>
-                  <a:srgbClr val="00B0F0"/>
-                </a:solidFill>
-              </a:rPr>
-              <a:t>Event Me</a:t>
-            </a:r>
-          </a:p>
-        </p:txBody>
-      </p:sp>
-      <p:sp>
-        <p:nvSpPr>
-          <p:cNvPr id="16" name="TextBox 15">
-            <a:extLst>
-              <a:ext uri="{FF2B5EF4-FFF2-40B4-BE49-F238E27FC236}">
-                <a16:creationId xmlns:a16="http://schemas.microsoft.com/office/drawing/2014/main" id="{9B384CA0-6715-4623-93ED-2D578324E324}"/>
-              </a:ext>
-            </a:extLst>
-          </p:cNvPr>
-          <p:cNvSpPr txBox="1"/>
-          <p:nvPr/>
-        </p:nvSpPr>
-        <p:spPr>
-          <a:xfrm>
-            <a:off x="6767515" y="1875945"/>
-            <a:ext cx="4433890" cy="369332"/>
-          </a:xfrm>
-          <a:prstGeom prst="rect">
-            <a:avLst/>
-          </a:prstGeom>
-          <a:noFill/>
-          <a:ln w="12700">
-            <a:solidFill>
-              <a:schemeClr val="tx1"/>
-            </a:solidFill>
-          </a:ln>
-        </p:spPr>
-        <p:txBody>
-          <a:bodyPr wrap="square" rtlCol="0">
-            <a:spAutoFit/>
-          </a:bodyPr>
-          <a:lstStyle/>
-          <a:p>
-            <a:r>
-              <a:rPr lang="en-US" dirty="0"/>
-              <a:t>Frist name….</a:t>
-            </a:r>
-          </a:p>
-        </p:txBody>
-      </p:sp>
-      <p:cxnSp>
-        <p:nvCxnSpPr>
-          <p:cNvPr id="3" name="Straight Connector 2">
-            <a:extLst>
-              <a:ext uri="{FF2B5EF4-FFF2-40B4-BE49-F238E27FC236}">
-                <a16:creationId xmlns:a16="http://schemas.microsoft.com/office/drawing/2014/main" id="{9FD266C3-CAF8-4117-B46B-ED92AD22781D}"/>
-              </a:ext>
-            </a:extLst>
-          </p:cNvPr>
-          <p:cNvCxnSpPr/>
-          <p:nvPr/>
-        </p:nvCxnSpPr>
-        <p:spPr>
-          <a:xfrm>
-            <a:off x="5829300" y="400050"/>
-            <a:ext cx="0" cy="6457950"/>
-          </a:xfrm>
-          <a:prstGeom prst="line">
-            <a:avLst/>
-          </a:prstGeom>
-        </p:spPr>
-        <p:style>
-          <a:lnRef idx="1">
-            <a:schemeClr val="accent1"/>
-          </a:lnRef>
-          <a:fillRef idx="0">
-            <a:schemeClr val="accent1"/>
-          </a:fillRef>
-          <a:effectRef idx="0">
-            <a:schemeClr val="accent1"/>
-          </a:effectRef>
-          <a:fontRef idx="minor">
-            <a:schemeClr val="tx1"/>
-          </a:fontRef>
-        </p:style>
-      </p:cxnSp>
-      <p:sp>
-        <p:nvSpPr>
-          <p:cNvPr id="14" name="TextBox 13">
-            <a:extLst>
-              <a:ext uri="{FF2B5EF4-FFF2-40B4-BE49-F238E27FC236}">
-                <a16:creationId xmlns:a16="http://schemas.microsoft.com/office/drawing/2014/main" id="{43AF0726-309B-4086-A7C6-BA3FE0065583}"/>
-              </a:ext>
-            </a:extLst>
-          </p:cNvPr>
-          <p:cNvSpPr txBox="1"/>
-          <p:nvPr/>
-        </p:nvSpPr>
-        <p:spPr>
-          <a:xfrm>
-            <a:off x="6957423" y="641148"/>
-            <a:ext cx="4054073" cy="923330"/>
-          </a:xfrm>
-          <a:prstGeom prst="rect">
-            <a:avLst/>
-          </a:prstGeom>
-          <a:noFill/>
-          <a:ln w="12700">
-            <a:noFill/>
-          </a:ln>
-        </p:spPr>
-        <p:txBody>
-          <a:bodyPr wrap="square" rtlCol="0">
-            <a:spAutoFit/>
-          </a:bodyPr>
-          <a:lstStyle/>
-          <a:p>
-            <a:pPr algn="ctr"/>
-            <a:r>
-              <a:rPr lang="en-US" sz="5400" dirty="0">
-                <a:solidFill>
-                  <a:srgbClr val="00B0F0"/>
-                </a:solidFill>
-              </a:rPr>
-              <a:t>Register</a:t>
-            </a:r>
-          </a:p>
-        </p:txBody>
-      </p:sp>
-      <p:sp>
-        <p:nvSpPr>
-          <p:cNvPr id="18" name="TextBox 17">
-            <a:extLst>
-              <a:ext uri="{FF2B5EF4-FFF2-40B4-BE49-F238E27FC236}">
-                <a16:creationId xmlns:a16="http://schemas.microsoft.com/office/drawing/2014/main" id="{40DF5FA4-ED7E-4CD2-99BE-3D246BD3B142}"/>
-              </a:ext>
-            </a:extLst>
-          </p:cNvPr>
-          <p:cNvSpPr txBox="1"/>
-          <p:nvPr/>
-        </p:nvSpPr>
-        <p:spPr>
-          <a:xfrm>
-            <a:off x="6767514" y="2429230"/>
-            <a:ext cx="4433890" cy="369332"/>
-          </a:xfrm>
-          <a:prstGeom prst="rect">
-            <a:avLst/>
-          </a:prstGeom>
-          <a:noFill/>
-          <a:ln w="12700">
-            <a:solidFill>
-              <a:schemeClr val="tx1"/>
-            </a:solidFill>
-          </a:ln>
-        </p:spPr>
-        <p:txBody>
-          <a:bodyPr wrap="square" rtlCol="0">
-            <a:spAutoFit/>
-          </a:bodyPr>
-          <a:lstStyle/>
-          <a:p>
-            <a:r>
-              <a:rPr lang="en-US" dirty="0"/>
-              <a:t>Last name….</a:t>
-            </a:r>
-          </a:p>
-        </p:txBody>
-      </p:sp>
-      <p:sp>
-        <p:nvSpPr>
-          <p:cNvPr id="19" name="TextBox 18">
-            <a:extLst>
-              <a:ext uri="{FF2B5EF4-FFF2-40B4-BE49-F238E27FC236}">
-                <a16:creationId xmlns:a16="http://schemas.microsoft.com/office/drawing/2014/main" id="{415DE095-C70D-4928-B638-53D5EE34A494}"/>
-              </a:ext>
-            </a:extLst>
-          </p:cNvPr>
-          <p:cNvSpPr txBox="1"/>
-          <p:nvPr/>
-        </p:nvSpPr>
-        <p:spPr>
-          <a:xfrm>
-            <a:off x="6767514" y="3036442"/>
-            <a:ext cx="4433887" cy="369332"/>
-          </a:xfrm>
-          <a:prstGeom prst="rect">
-            <a:avLst/>
-          </a:prstGeom>
-          <a:noFill/>
-          <a:ln w="12700">
-            <a:solidFill>
-              <a:schemeClr val="tx1"/>
-            </a:solidFill>
-          </a:ln>
-        </p:spPr>
-        <p:txBody>
-          <a:bodyPr wrap="square" rtlCol="0">
-            <a:spAutoFit/>
-          </a:bodyPr>
-          <a:lstStyle/>
-          <a:p>
-            <a:r>
-              <a:rPr lang="en-US" dirty="0"/>
-              <a:t>Birth of date……</a:t>
-            </a:r>
-          </a:p>
-        </p:txBody>
-      </p:sp>
-      <p:sp>
-        <p:nvSpPr>
-          <p:cNvPr id="21" name="TextBox 20">
-            <a:extLst>
-              <a:ext uri="{FF2B5EF4-FFF2-40B4-BE49-F238E27FC236}">
-                <a16:creationId xmlns:a16="http://schemas.microsoft.com/office/drawing/2014/main" id="{3EFE3195-E4F2-4182-AA6B-44F99A79E97F}"/>
-              </a:ext>
-            </a:extLst>
-          </p:cNvPr>
-          <p:cNvSpPr txBox="1"/>
-          <p:nvPr/>
-        </p:nvSpPr>
-        <p:spPr>
-          <a:xfrm>
-            <a:off x="6698462" y="3629025"/>
-            <a:ext cx="917977" cy="369332"/>
-          </a:xfrm>
-          <a:prstGeom prst="rect">
-            <a:avLst/>
-          </a:prstGeom>
-          <a:noFill/>
-          <a:ln w="12700">
-            <a:solidFill>
-              <a:schemeClr val="tx1"/>
-            </a:solidFill>
-          </a:ln>
-        </p:spPr>
-        <p:txBody>
-          <a:bodyPr wrap="square" rtlCol="0">
-            <a:spAutoFit/>
-          </a:bodyPr>
-          <a:lstStyle/>
-          <a:p>
-            <a:r>
-              <a:rPr lang="en-US" dirty="0"/>
-              <a:t>Gender</a:t>
-            </a:r>
-          </a:p>
-        </p:txBody>
-      </p:sp>
-      <p:sp>
-        <p:nvSpPr>
-          <p:cNvPr id="24" name="TextBox 23">
-            <a:extLst>
-              <a:ext uri="{FF2B5EF4-FFF2-40B4-BE49-F238E27FC236}">
-                <a16:creationId xmlns:a16="http://schemas.microsoft.com/office/drawing/2014/main" id="{FC544C1E-50E2-43A5-8937-CC7A5DE4CD0D}"/>
-              </a:ext>
-            </a:extLst>
-          </p:cNvPr>
-          <p:cNvSpPr txBox="1"/>
-          <p:nvPr/>
-        </p:nvSpPr>
-        <p:spPr>
-          <a:xfrm>
-            <a:off x="6769899" y="4221608"/>
-            <a:ext cx="4433887" cy="369332"/>
-          </a:xfrm>
-          <a:prstGeom prst="rect">
-            <a:avLst/>
-          </a:prstGeom>
-          <a:noFill/>
-          <a:ln w="12700">
-            <a:solidFill>
-              <a:schemeClr val="tx1"/>
-            </a:solidFill>
-          </a:ln>
-        </p:spPr>
-        <p:txBody>
-          <a:bodyPr wrap="square" rtlCol="0">
-            <a:spAutoFit/>
-          </a:bodyPr>
-          <a:lstStyle/>
-          <a:p>
-            <a:r>
-              <a:rPr lang="en-US" dirty="0"/>
-              <a:t>Choose image </a:t>
-            </a:r>
-          </a:p>
-        </p:txBody>
-      </p:sp>
-      <p:sp>
-        <p:nvSpPr>
-          <p:cNvPr id="26" name="TextBox 25">
-            <a:extLst>
-              <a:ext uri="{FF2B5EF4-FFF2-40B4-BE49-F238E27FC236}">
-                <a16:creationId xmlns:a16="http://schemas.microsoft.com/office/drawing/2014/main" id="{845AE085-2114-4405-802D-2B67BD4F816C}"/>
-              </a:ext>
-            </a:extLst>
-          </p:cNvPr>
-          <p:cNvSpPr txBox="1"/>
-          <p:nvPr/>
-        </p:nvSpPr>
-        <p:spPr>
-          <a:xfrm>
-            <a:off x="9823852" y="4883554"/>
-            <a:ext cx="1377549" cy="523220"/>
-          </a:xfrm>
-          <a:prstGeom prst="rect">
-            <a:avLst/>
-          </a:prstGeom>
-          <a:solidFill>
-            <a:srgbClr val="00B0F0"/>
-          </a:solidFill>
-          <a:ln w="12700">
-            <a:noFill/>
-          </a:ln>
-        </p:spPr>
-        <p:txBody>
-          <a:bodyPr wrap="square" rtlCol="0">
-            <a:spAutoFit/>
-          </a:bodyPr>
-          <a:lstStyle/>
-          <a:p>
-            <a:pPr algn="ctr"/>
-            <a:r>
-              <a:rPr lang="en-US" sz="2800" dirty="0">
-                <a:solidFill>
-                  <a:schemeClr val="bg1"/>
-                </a:solidFill>
-                <a:sym typeface="Wingdings" panose="05000000000000000000" pitchFamily="2" charset="2"/>
-              </a:rPr>
-              <a:t>Next</a:t>
-            </a:r>
-            <a:endParaRPr lang="en-US" sz="2800" dirty="0">
-              <a:solidFill>
-                <a:schemeClr val="bg1"/>
-              </a:solidFill>
-            </a:endParaRPr>
-          </a:p>
-        </p:txBody>
-      </p:sp>
+      </p:pic>
     </p:spTree>
     <p:extLst>
       <p:ext uri="{BB962C8B-B14F-4D97-AF65-F5344CB8AC3E}">
-        <p14:creationId xmlns:p14="http://schemas.microsoft.com/office/powerpoint/2010/main" val="1257240822"/>
+        <p14:creationId xmlns:p14="http://schemas.microsoft.com/office/powerpoint/2010/main" val="505186279"/>
       </p:ext>
     </p:extLst>
   </p:cSld>
@@ -4155,394 +4031,40 @@
           <a:chExt cx="0" cy="0"/>
         </a:xfrm>
       </p:grpSpPr>
-      <p:sp>
-        <p:nvSpPr>
-          <p:cNvPr id="7" name="Oval 6">
-            <a:extLst>
-              <a:ext uri="{FF2B5EF4-FFF2-40B4-BE49-F238E27FC236}">
-                <a16:creationId xmlns:a16="http://schemas.microsoft.com/office/drawing/2014/main" id="{D981531D-218D-4885-8564-6E97E74DE1C9}"/>
-              </a:ext>
-            </a:extLst>
-          </p:cNvPr>
-          <p:cNvSpPr/>
+      <p:pic>
+        <p:nvPicPr>
+          <p:cNvPr id="2" name="Picture 1">
+            <a:extLst>
+              <a:ext uri="{FF2B5EF4-FFF2-40B4-BE49-F238E27FC236}">
+                <a16:creationId xmlns:a16="http://schemas.microsoft.com/office/drawing/2014/main" id="{509A444C-F283-4D69-B421-361AE5B8BB4E}"/>
+              </a:ext>
+            </a:extLst>
+          </p:cNvPr>
+          <p:cNvPicPr>
+            <a:picLocks noChangeAspect="1"/>
+          </p:cNvPicPr>
           <p:nvPr/>
-        </p:nvSpPr>
+        </p:nvPicPr>
+        <p:blipFill>
+          <a:blip r:embed="rId2"/>
+          <a:stretch>
+            <a:fillRect/>
+          </a:stretch>
+        </p:blipFill>
         <p:spPr>
           <a:xfrm>
-            <a:off x="2013337" y="1748431"/>
-            <a:ext cx="2100262" cy="2100262"/>
-          </a:xfrm>
-          <a:prstGeom prst="ellipse">
-            <a:avLst/>
-          </a:prstGeom>
-          <a:solidFill>
-            <a:srgbClr val="00B0F0"/>
-          </a:solidFill>
-        </p:spPr>
-        <p:style>
-          <a:lnRef idx="2">
-            <a:schemeClr val="accent1">
-              <a:shade val="50000"/>
-            </a:schemeClr>
-          </a:lnRef>
-          <a:fillRef idx="1">
-            <a:schemeClr val="accent1"/>
-          </a:fillRef>
-          <a:effectRef idx="0">
-            <a:schemeClr val="accent1"/>
-          </a:effectRef>
-          <a:fontRef idx="minor">
-            <a:schemeClr val="lt1"/>
-          </a:fontRef>
-        </p:style>
-        <p:txBody>
-          <a:bodyPr rtlCol="0" anchor="ctr"/>
-          <a:lstStyle/>
-          <a:p>
-            <a:pPr algn="ctr"/>
-            <a:endParaRPr lang="en-US"/>
-          </a:p>
-        </p:txBody>
-      </p:sp>
-      <p:sp>
-        <p:nvSpPr>
-          <p:cNvPr id="8" name="TextBox 7">
-            <a:extLst>
-              <a:ext uri="{FF2B5EF4-FFF2-40B4-BE49-F238E27FC236}">
-                <a16:creationId xmlns:a16="http://schemas.microsoft.com/office/drawing/2014/main" id="{37938559-6891-4DC6-B0B4-2212BB1CCFF2}"/>
-              </a:ext>
-            </a:extLst>
-          </p:cNvPr>
-          <p:cNvSpPr txBox="1"/>
-          <p:nvPr/>
-        </p:nvSpPr>
-        <p:spPr>
-          <a:xfrm>
-            <a:off x="2499116" y="4022826"/>
-            <a:ext cx="1042980" cy="369332"/>
+            <a:off x="1785938" y="486560"/>
+            <a:ext cx="8620124" cy="6199496"/>
           </a:xfrm>
           <a:prstGeom prst="rect">
             <a:avLst/>
           </a:prstGeom>
-          <a:noFill/>
         </p:spPr>
-        <p:txBody>
-          <a:bodyPr wrap="square" rtlCol="0">
-            <a:spAutoFit/>
-          </a:bodyPr>
-          <a:lstStyle/>
-          <a:p>
-            <a:r>
-              <a:rPr lang="en-US" dirty="0"/>
-              <a:t>PNC-VC2</a:t>
-            </a:r>
-          </a:p>
-        </p:txBody>
-      </p:sp>
-      <p:sp>
-        <p:nvSpPr>
-          <p:cNvPr id="9" name="TextBox 8">
-            <a:extLst>
-              <a:ext uri="{FF2B5EF4-FFF2-40B4-BE49-F238E27FC236}">
-                <a16:creationId xmlns:a16="http://schemas.microsoft.com/office/drawing/2014/main" id="{146E9E17-DAA2-44CB-963F-661D0AC72D2C}"/>
-              </a:ext>
-            </a:extLst>
-          </p:cNvPr>
-          <p:cNvSpPr txBox="1"/>
-          <p:nvPr/>
-        </p:nvSpPr>
-        <p:spPr>
-          <a:xfrm>
-            <a:off x="2013344" y="4383594"/>
-            <a:ext cx="2100255" cy="646331"/>
-          </a:xfrm>
-          <a:prstGeom prst="rect">
-            <a:avLst/>
-          </a:prstGeom>
-          <a:noFill/>
-        </p:spPr>
-        <p:txBody>
-          <a:bodyPr wrap="square" rtlCol="0">
-            <a:spAutoFit/>
-          </a:bodyPr>
-          <a:lstStyle/>
-          <a:p>
-            <a:r>
-              <a:rPr lang="en-US" sz="3600" dirty="0">
-                <a:solidFill>
-                  <a:srgbClr val="00B0F0"/>
-                </a:solidFill>
-              </a:rPr>
-              <a:t>Event Me</a:t>
-            </a:r>
-          </a:p>
-        </p:txBody>
-      </p:sp>
-      <p:sp>
-        <p:nvSpPr>
-          <p:cNvPr id="22" name="TextBox 21">
-            <a:extLst>
-              <a:ext uri="{FF2B5EF4-FFF2-40B4-BE49-F238E27FC236}">
-                <a16:creationId xmlns:a16="http://schemas.microsoft.com/office/drawing/2014/main" id="{5FF7AE07-2BA0-4760-A006-99280F906531}"/>
-              </a:ext>
-            </a:extLst>
-          </p:cNvPr>
-          <p:cNvSpPr txBox="1"/>
-          <p:nvPr/>
-        </p:nvSpPr>
-        <p:spPr>
-          <a:xfrm>
-            <a:off x="6824662" y="3972631"/>
-            <a:ext cx="1077531" cy="523220"/>
-          </a:xfrm>
-          <a:prstGeom prst="rect">
-            <a:avLst/>
-          </a:prstGeom>
-          <a:solidFill>
-            <a:srgbClr val="00B0F0"/>
-          </a:solidFill>
-          <a:ln w="12700">
-            <a:noFill/>
-          </a:ln>
-        </p:spPr>
-        <p:txBody>
-          <a:bodyPr wrap="square" rtlCol="0">
-            <a:spAutoFit/>
-          </a:bodyPr>
-          <a:lstStyle/>
-          <a:p>
-            <a:pPr algn="ctr"/>
-            <a:r>
-              <a:rPr lang="en-US" sz="2800" dirty="0">
-                <a:solidFill>
-                  <a:schemeClr val="bg1"/>
-                </a:solidFill>
-                <a:sym typeface="Wingdings" panose="05000000000000000000" pitchFamily="2" charset="2"/>
-              </a:rPr>
-              <a:t>Back</a:t>
-            </a:r>
-            <a:endParaRPr lang="en-US" sz="2800" dirty="0">
-              <a:solidFill>
-                <a:schemeClr val="bg1"/>
-              </a:solidFill>
-            </a:endParaRPr>
-          </a:p>
-        </p:txBody>
-      </p:sp>
-      <p:cxnSp>
-        <p:nvCxnSpPr>
-          <p:cNvPr id="3" name="Straight Connector 2">
-            <a:extLst>
-              <a:ext uri="{FF2B5EF4-FFF2-40B4-BE49-F238E27FC236}">
-                <a16:creationId xmlns:a16="http://schemas.microsoft.com/office/drawing/2014/main" id="{9FD266C3-CAF8-4117-B46B-ED92AD22781D}"/>
-              </a:ext>
-            </a:extLst>
-          </p:cNvPr>
-          <p:cNvCxnSpPr/>
-          <p:nvPr/>
-        </p:nvCxnSpPr>
-        <p:spPr>
-          <a:xfrm>
-            <a:off x="5829300" y="400050"/>
-            <a:ext cx="0" cy="6457950"/>
-          </a:xfrm>
-          <a:prstGeom prst="line">
-            <a:avLst/>
-          </a:prstGeom>
-        </p:spPr>
-        <p:style>
-          <a:lnRef idx="1">
-            <a:schemeClr val="accent1"/>
-          </a:lnRef>
-          <a:fillRef idx="0">
-            <a:schemeClr val="accent1"/>
-          </a:fillRef>
-          <a:effectRef idx="0">
-            <a:schemeClr val="accent1"/>
-          </a:effectRef>
-          <a:fontRef idx="minor">
-            <a:schemeClr val="tx1"/>
-          </a:fontRef>
-        </p:style>
-      </p:cxnSp>
-      <p:sp>
-        <p:nvSpPr>
-          <p:cNvPr id="14" name="TextBox 13">
-            <a:extLst>
-              <a:ext uri="{FF2B5EF4-FFF2-40B4-BE49-F238E27FC236}">
-                <a16:creationId xmlns:a16="http://schemas.microsoft.com/office/drawing/2014/main" id="{43AF0726-309B-4086-A7C6-BA3FE0065583}"/>
-              </a:ext>
-            </a:extLst>
-          </p:cNvPr>
-          <p:cNvSpPr txBox="1"/>
-          <p:nvPr/>
-        </p:nvSpPr>
-        <p:spPr>
-          <a:xfrm>
-            <a:off x="6957423" y="641148"/>
-            <a:ext cx="4054073" cy="923330"/>
-          </a:xfrm>
-          <a:prstGeom prst="rect">
-            <a:avLst/>
-          </a:prstGeom>
-          <a:noFill/>
-          <a:ln w="12700">
-            <a:noFill/>
-          </a:ln>
-        </p:spPr>
-        <p:txBody>
-          <a:bodyPr wrap="square" rtlCol="0">
-            <a:spAutoFit/>
-          </a:bodyPr>
-          <a:lstStyle/>
-          <a:p>
-            <a:pPr algn="ctr"/>
-            <a:r>
-              <a:rPr lang="en-US" sz="5400" dirty="0">
-                <a:solidFill>
-                  <a:srgbClr val="00B0F0"/>
-                </a:solidFill>
-              </a:rPr>
-              <a:t>Register</a:t>
-            </a:r>
-          </a:p>
-        </p:txBody>
-      </p:sp>
-      <p:sp>
-        <p:nvSpPr>
-          <p:cNvPr id="24" name="TextBox 23">
-            <a:extLst>
-              <a:ext uri="{FF2B5EF4-FFF2-40B4-BE49-F238E27FC236}">
-                <a16:creationId xmlns:a16="http://schemas.microsoft.com/office/drawing/2014/main" id="{FC544C1E-50E2-43A5-8937-CC7A5DE4CD0D}"/>
-              </a:ext>
-            </a:extLst>
-          </p:cNvPr>
-          <p:cNvSpPr txBox="1"/>
-          <p:nvPr/>
-        </p:nvSpPr>
-        <p:spPr>
-          <a:xfrm>
-            <a:off x="6824663" y="2445303"/>
-            <a:ext cx="4433887" cy="369332"/>
-          </a:xfrm>
-          <a:prstGeom prst="rect">
-            <a:avLst/>
-          </a:prstGeom>
-          <a:noFill/>
-          <a:ln w="12700">
-            <a:solidFill>
-              <a:schemeClr val="tx1"/>
-            </a:solidFill>
-          </a:ln>
-        </p:spPr>
-        <p:txBody>
-          <a:bodyPr wrap="square" rtlCol="0">
-            <a:spAutoFit/>
-          </a:bodyPr>
-          <a:lstStyle/>
-          <a:p>
-            <a:r>
-              <a:rPr lang="en-US" dirty="0"/>
-              <a:t>Email….</a:t>
-            </a:r>
-          </a:p>
-        </p:txBody>
-      </p:sp>
-      <p:sp>
-        <p:nvSpPr>
-          <p:cNvPr id="25" name="TextBox 24">
-            <a:extLst>
-              <a:ext uri="{FF2B5EF4-FFF2-40B4-BE49-F238E27FC236}">
-                <a16:creationId xmlns:a16="http://schemas.microsoft.com/office/drawing/2014/main" id="{458F9B35-2784-4E6B-8F98-A03AEED3CF76}"/>
-              </a:ext>
-            </a:extLst>
-          </p:cNvPr>
-          <p:cNvSpPr txBox="1"/>
-          <p:nvPr/>
-        </p:nvSpPr>
-        <p:spPr>
-          <a:xfrm>
-            <a:off x="6824663" y="3208967"/>
-            <a:ext cx="4433887" cy="369332"/>
-          </a:xfrm>
-          <a:prstGeom prst="rect">
-            <a:avLst/>
-          </a:prstGeom>
-          <a:noFill/>
-          <a:ln w="12700">
-            <a:solidFill>
-              <a:schemeClr val="tx1"/>
-            </a:solidFill>
-          </a:ln>
-        </p:spPr>
-        <p:txBody>
-          <a:bodyPr wrap="square" rtlCol="0">
-            <a:spAutoFit/>
-          </a:bodyPr>
-          <a:lstStyle/>
-          <a:p>
-            <a:r>
-              <a:rPr lang="en-US" dirty="0"/>
-              <a:t>Password….</a:t>
-            </a:r>
-          </a:p>
-        </p:txBody>
-      </p:sp>
-      <p:sp>
-        <p:nvSpPr>
-          <p:cNvPr id="26" name="TextBox 25">
-            <a:extLst>
-              <a:ext uri="{FF2B5EF4-FFF2-40B4-BE49-F238E27FC236}">
-                <a16:creationId xmlns:a16="http://schemas.microsoft.com/office/drawing/2014/main" id="{845AE085-2114-4405-802D-2B67BD4F816C}"/>
-              </a:ext>
-            </a:extLst>
-          </p:cNvPr>
-          <p:cNvSpPr txBox="1"/>
-          <p:nvPr/>
-        </p:nvSpPr>
-        <p:spPr>
-          <a:xfrm>
-            <a:off x="9953647" y="3972631"/>
-            <a:ext cx="1377549" cy="523220"/>
-          </a:xfrm>
-          <a:prstGeom prst="rect">
-            <a:avLst/>
-          </a:prstGeom>
-          <a:solidFill>
-            <a:srgbClr val="00B0F0"/>
-          </a:solidFill>
-          <a:ln w="12700">
-            <a:noFill/>
-          </a:ln>
-        </p:spPr>
-        <p:txBody>
-          <a:bodyPr wrap="square" rtlCol="0">
-            <a:spAutoFit/>
-          </a:bodyPr>
-          <a:lstStyle/>
-          <a:p>
-            <a:pPr algn="ctr"/>
-            <a:r>
-              <a:rPr lang="en-US" sz="2800" dirty="0">
-                <a:solidFill>
-                  <a:schemeClr val="bg1"/>
-                </a:solidFill>
-                <a:sym typeface="Wingdings" panose="05000000000000000000" pitchFamily="2" charset="2"/>
-              </a:rPr>
-              <a:t>Sign in</a:t>
-            </a:r>
-            <a:endParaRPr lang="en-US" sz="2800" dirty="0">
-              <a:solidFill>
-                <a:schemeClr val="bg1"/>
-              </a:solidFill>
-            </a:endParaRPr>
-          </a:p>
-        </p:txBody>
-      </p:sp>
+      </p:pic>
     </p:spTree>
     <p:extLst>
       <p:ext uri="{BB962C8B-B14F-4D97-AF65-F5344CB8AC3E}">
-        <p14:creationId xmlns:p14="http://schemas.microsoft.com/office/powerpoint/2010/main" val="1538670635"/>
+        <p14:creationId xmlns:p14="http://schemas.microsoft.com/office/powerpoint/2010/main" val="1692123257"/>
       </p:ext>
     </p:extLst>
   </p:cSld>
@@ -4845,4 +4367,299 @@
     </a:ext>
   </a:extLst>
 </a:theme>
+</file>
+
+<file path=ppt/theme/theme2.xml><?xml version="1.0" encoding="utf-8"?>
+<a:theme xmlns:a="http://schemas.openxmlformats.org/drawingml/2006/main" name="Office Theme">
+  <a:themeElements>
+    <a:clrScheme name="Office">
+      <a:dk1>
+        <a:sysClr val="windowText" lastClr="000000"/>
+      </a:dk1>
+      <a:lt1>
+        <a:sysClr val="window" lastClr="FFFFFF"/>
+      </a:lt1>
+      <a:dk2>
+        <a:srgbClr val="44546A"/>
+      </a:dk2>
+      <a:lt2>
+        <a:srgbClr val="E7E6E6"/>
+      </a:lt2>
+      <a:accent1>
+        <a:srgbClr val="4472C4"/>
+      </a:accent1>
+      <a:accent2>
+        <a:srgbClr val="ED7D31"/>
+      </a:accent2>
+      <a:accent3>
+        <a:srgbClr val="A5A5A5"/>
+      </a:accent3>
+      <a:accent4>
+        <a:srgbClr val="FFC000"/>
+      </a:accent4>
+      <a:accent5>
+        <a:srgbClr val="5B9BD5"/>
+      </a:accent5>
+      <a:accent6>
+        <a:srgbClr val="70AD47"/>
+      </a:accent6>
+      <a:hlink>
+        <a:srgbClr val="0563C1"/>
+      </a:hlink>
+      <a:folHlink>
+        <a:srgbClr val="954F72"/>
+      </a:folHlink>
+    </a:clrScheme>
+    <a:fontScheme name="Office">
+      <a:majorFont>
+        <a:latin typeface="Calibri Light" panose="020F0302020204030204"/>
+        <a:ea typeface=""/>
+        <a:cs typeface=""/>
+        <a:font script="Jpan" typeface="游ゴシック Light"/>
+        <a:font script="Hang" typeface="맑은 고딕"/>
+        <a:font script="Hans" typeface="等线 Light"/>
+        <a:font script="Hant" typeface="新細明體"/>
+        <a:font script="Arab" typeface="Times New Roman"/>
+        <a:font script="Hebr" typeface="Times New Roman"/>
+        <a:font script="Thai" typeface="Angsana New"/>
+        <a:font script="Ethi" typeface="Nyala"/>
+        <a:font script="Beng" typeface="Vrinda"/>
+        <a:font script="Gujr" typeface="Shruti"/>
+        <a:font script="Khmr" typeface="MoolBoran"/>
+        <a:font script="Knda" typeface="Tunga"/>
+        <a:font script="Guru" typeface="Raavi"/>
+        <a:font script="Cans" typeface="Euphemia"/>
+        <a:font script="Cher" typeface="Plantagenet Cherokee"/>
+        <a:font script="Yiii" typeface="Microsoft Yi Baiti"/>
+        <a:font script="Tibt" typeface="Microsoft Himalaya"/>
+        <a:font script="Thaa" typeface="MV Boli"/>
+        <a:font script="Deva" typeface="Mangal"/>
+        <a:font script="Telu" typeface="Gautami"/>
+        <a:font script="Taml" typeface="Latha"/>
+        <a:font script="Syrc" typeface="Estrangelo Edessa"/>
+        <a:font script="Orya" typeface="Kalinga"/>
+        <a:font script="Mlym" typeface="Kartika"/>
+        <a:font script="Laoo" typeface="DokChampa"/>
+        <a:font script="Sinh" typeface="Iskoola Pota"/>
+        <a:font script="Mong" typeface="Mongolian Baiti"/>
+        <a:font script="Viet" typeface="Times New Roman"/>
+        <a:font script="Uigh" typeface="Microsoft Uighur"/>
+        <a:font script="Geor" typeface="Sylfaen"/>
+        <a:font script="Armn" typeface="Arial"/>
+        <a:font script="Bugi" typeface="Leelawadee UI"/>
+        <a:font script="Bopo" typeface="Microsoft JhengHei"/>
+        <a:font script="Java" typeface="Javanese Text"/>
+        <a:font script="Lisu" typeface="Segoe UI"/>
+        <a:font script="Mymr" typeface="Myanmar Text"/>
+        <a:font script="Nkoo" typeface="Ebrima"/>
+        <a:font script="Olck" typeface="Nirmala UI"/>
+        <a:font script="Osma" typeface="Ebrima"/>
+        <a:font script="Phag" typeface="Phagspa"/>
+        <a:font script="Syrn" typeface="Estrangelo Edessa"/>
+        <a:font script="Syrj" typeface="Estrangelo Edessa"/>
+        <a:font script="Syre" typeface="Estrangelo Edessa"/>
+        <a:font script="Sora" typeface="Nirmala UI"/>
+        <a:font script="Tale" typeface="Microsoft Tai Le"/>
+        <a:font script="Talu" typeface="Microsoft New Tai Lue"/>
+        <a:font script="Tfng" typeface="Ebrima"/>
+      </a:majorFont>
+      <a:minorFont>
+        <a:latin typeface="Calibri" panose="020F0502020204030204"/>
+        <a:ea typeface=""/>
+        <a:cs typeface=""/>
+        <a:font script="Jpan" typeface="游ゴシック"/>
+        <a:font script="Hang" typeface="맑은 고딕"/>
+        <a:font script="Hans" typeface="等线"/>
+        <a:font script="Hant" typeface="新細明體"/>
+        <a:font script="Arab" typeface="Arial"/>
+        <a:font script="Hebr" typeface="Arial"/>
+        <a:font script="Thai" typeface="Cordia New"/>
+        <a:font script="Ethi" typeface="Nyala"/>
+        <a:font script="Beng" typeface="Vrinda"/>
+        <a:font script="Gujr" typeface="Shruti"/>
+        <a:font script="Khmr" typeface="DaunPenh"/>
+        <a:font script="Knda" typeface="Tunga"/>
+        <a:font script="Guru" typeface="Raavi"/>
+        <a:font script="Cans" typeface="Euphemia"/>
+        <a:font script="Cher" typeface="Plantagenet Cherokee"/>
+        <a:font script="Yiii" typeface="Microsoft Yi Baiti"/>
+        <a:font script="Tibt" typeface="Microsoft Himalaya"/>
+        <a:font script="Thaa" typeface="MV Boli"/>
+        <a:font script="Deva" typeface="Mangal"/>
+        <a:font script="Telu" typeface="Gautami"/>
+        <a:font script="Taml" typeface="Latha"/>
+        <a:font script="Syrc" typeface="Estrangelo Edessa"/>
+        <a:font script="Orya" typeface="Kalinga"/>
+        <a:font script="Mlym" typeface="Kartika"/>
+        <a:font script="Laoo" typeface="DokChampa"/>
+        <a:font script="Sinh" typeface="Iskoola Pota"/>
+        <a:font script="Mong" typeface="Mongolian Baiti"/>
+        <a:font script="Viet" typeface="Arial"/>
+        <a:font script="Uigh" typeface="Microsoft Uighur"/>
+        <a:font script="Geor" typeface="Sylfaen"/>
+        <a:font script="Armn" typeface="Arial"/>
+        <a:font script="Bugi" typeface="Leelawadee UI"/>
+        <a:font script="Bopo" typeface="Microsoft JhengHei"/>
+        <a:font script="Java" typeface="Javanese Text"/>
+        <a:font script="Lisu" typeface="Segoe UI"/>
+        <a:font script="Mymr" typeface="Myanmar Text"/>
+        <a:font script="Nkoo" typeface="Ebrima"/>
+        <a:font script="Olck" typeface="Nirmala UI"/>
+        <a:font script="Osma" typeface="Ebrima"/>
+        <a:font script="Phag" typeface="Phagspa"/>
+        <a:font script="Syrn" typeface="Estrangelo Edessa"/>
+        <a:font script="Syrj" typeface="Estrangelo Edessa"/>
+        <a:font script="Syre" typeface="Estrangelo Edessa"/>
+        <a:font script="Sora" typeface="Nirmala UI"/>
+        <a:font script="Tale" typeface="Microsoft Tai Le"/>
+        <a:font script="Talu" typeface="Microsoft New Tai Lue"/>
+        <a:font script="Tfng" typeface="Ebrima"/>
+      </a:minorFont>
+    </a:fontScheme>
+    <a:fmtScheme name="Office">
+      <a:fillStyleLst>
+        <a:solidFill>
+          <a:schemeClr val="phClr"/>
+        </a:solidFill>
+        <a:gradFill rotWithShape="1">
+          <a:gsLst>
+            <a:gs pos="0">
+              <a:schemeClr val="phClr">
+                <a:lumMod val="110000"/>
+                <a:satMod val="105000"/>
+                <a:tint val="67000"/>
+              </a:schemeClr>
+            </a:gs>
+            <a:gs pos="50000">
+              <a:schemeClr val="phClr">
+                <a:lumMod val="105000"/>
+                <a:satMod val="103000"/>
+                <a:tint val="73000"/>
+              </a:schemeClr>
+            </a:gs>
+            <a:gs pos="100000">
+              <a:schemeClr val="phClr">
+                <a:lumMod val="105000"/>
+                <a:satMod val="109000"/>
+                <a:tint val="81000"/>
+              </a:schemeClr>
+            </a:gs>
+          </a:gsLst>
+          <a:lin ang="5400000" scaled="0"/>
+        </a:gradFill>
+        <a:gradFill rotWithShape="1">
+          <a:gsLst>
+            <a:gs pos="0">
+              <a:schemeClr val="phClr">
+                <a:satMod val="103000"/>
+                <a:lumMod val="102000"/>
+                <a:tint val="94000"/>
+              </a:schemeClr>
+            </a:gs>
+            <a:gs pos="50000">
+              <a:schemeClr val="phClr">
+                <a:satMod val="110000"/>
+                <a:lumMod val="100000"/>
+                <a:shade val="100000"/>
+              </a:schemeClr>
+            </a:gs>
+            <a:gs pos="100000">
+              <a:schemeClr val="phClr">
+                <a:lumMod val="99000"/>
+                <a:satMod val="120000"/>
+                <a:shade val="78000"/>
+              </a:schemeClr>
+            </a:gs>
+          </a:gsLst>
+          <a:lin ang="5400000" scaled="0"/>
+        </a:gradFill>
+      </a:fillStyleLst>
+      <a:lnStyleLst>
+        <a:ln w="6350" cap="flat" cmpd="sng" algn="ctr">
+          <a:solidFill>
+            <a:schemeClr val="phClr"/>
+          </a:solidFill>
+          <a:prstDash val="solid"/>
+          <a:miter lim="800000"/>
+        </a:ln>
+        <a:ln w="12700" cap="flat" cmpd="sng" algn="ctr">
+          <a:solidFill>
+            <a:schemeClr val="phClr"/>
+          </a:solidFill>
+          <a:prstDash val="solid"/>
+          <a:miter lim="800000"/>
+        </a:ln>
+        <a:ln w="19050" cap="flat" cmpd="sng" algn="ctr">
+          <a:solidFill>
+            <a:schemeClr val="phClr"/>
+          </a:solidFill>
+          <a:prstDash val="solid"/>
+          <a:miter lim="800000"/>
+        </a:ln>
+      </a:lnStyleLst>
+      <a:effectStyleLst>
+        <a:effectStyle>
+          <a:effectLst/>
+        </a:effectStyle>
+        <a:effectStyle>
+          <a:effectLst/>
+        </a:effectStyle>
+        <a:effectStyle>
+          <a:effectLst>
+            <a:outerShdw blurRad="57150" dist="19050" dir="5400000" algn="ctr" rotWithShape="0">
+              <a:srgbClr val="000000">
+                <a:alpha val="63000"/>
+              </a:srgbClr>
+            </a:outerShdw>
+          </a:effectLst>
+        </a:effectStyle>
+      </a:effectStyleLst>
+      <a:bgFillStyleLst>
+        <a:solidFill>
+          <a:schemeClr val="phClr"/>
+        </a:solidFill>
+        <a:solidFill>
+          <a:schemeClr val="phClr">
+            <a:tint val="95000"/>
+            <a:satMod val="170000"/>
+          </a:schemeClr>
+        </a:solidFill>
+        <a:gradFill rotWithShape="1">
+          <a:gsLst>
+            <a:gs pos="0">
+              <a:schemeClr val="phClr">
+                <a:tint val="93000"/>
+                <a:satMod val="150000"/>
+                <a:shade val="98000"/>
+                <a:lumMod val="102000"/>
+              </a:schemeClr>
+            </a:gs>
+            <a:gs pos="50000">
+              <a:schemeClr val="phClr">
+                <a:tint val="98000"/>
+                <a:satMod val="130000"/>
+                <a:shade val="90000"/>
+                <a:lumMod val="103000"/>
+              </a:schemeClr>
+            </a:gs>
+            <a:gs pos="100000">
+              <a:schemeClr val="phClr">
+                <a:shade val="63000"/>
+                <a:satMod val="120000"/>
+              </a:schemeClr>
+            </a:gs>
+          </a:gsLst>
+          <a:lin ang="5400000" scaled="0"/>
+        </a:gradFill>
+      </a:bgFillStyleLst>
+    </a:fmtScheme>
+  </a:themeElements>
+  <a:objectDefaults/>
+  <a:extraClrSchemeLst/>
+  <a:extLst>
+    <a:ext uri="{05A4C25C-085E-4340-85A3-A5531E510DB2}">
+      <thm15:themeFamily xmlns:thm15="http://schemas.microsoft.com/office/thememl/2012/main" name="Office Theme" id="{62F939B6-93AF-4DB8-9C6B-D6C7DFDC589F}" vid="{4A3C46E8-61CC-4603-A589-7422A47A8E4A}"/>
+    </a:ext>
+  </a:extLst>
+</a:theme>
 </file>
</xml_diff>